<commit_message>
technical and actual powerpoints
</commit_message>
<xml_diff>
--- a/Project2/Project2_Powerpoint.pptx
+++ b/Project2/Project2_Powerpoint.pptx
@@ -5,7 +5,7 @@
     <p:sldMasterId id="2147483788" r:id="rId1"/>
   </p:sldMasterIdLst>
   <p:notesMasterIdLst>
-    <p:notesMasterId r:id="rId19"/>
+    <p:notesMasterId r:id="rId20"/>
   </p:notesMasterIdLst>
   <p:sldIdLst>
     <p:sldId id="256" r:id="rId2"/>
@@ -18,13 +18,14 @@
     <p:sldId id="259" r:id="rId9"/>
     <p:sldId id="261" r:id="rId10"/>
     <p:sldId id="262" r:id="rId11"/>
-    <p:sldId id="270" r:id="rId12"/>
-    <p:sldId id="263" r:id="rId13"/>
-    <p:sldId id="269" r:id="rId14"/>
-    <p:sldId id="271" r:id="rId15"/>
+    <p:sldId id="263" r:id="rId12"/>
+    <p:sldId id="273" r:id="rId13"/>
+    <p:sldId id="270" r:id="rId14"/>
+    <p:sldId id="269" r:id="rId15"/>
     <p:sldId id="272" r:id="rId16"/>
     <p:sldId id="268" r:id="rId17"/>
     <p:sldId id="264" r:id="rId18"/>
+    <p:sldId id="276" r:id="rId19"/>
   </p:sldIdLst>
   <p:sldSz cx="12192000" cy="6858000"/>
   <p:notesSz cx="6858000" cy="9144000"/>
@@ -4897,6 +4898,384 @@
 </file>
 
 <file path=ppt/slides/slide11.xml><?xml version="1.0" encoding="utf-8"?>
+<p:sld xmlns:a="http://schemas.openxmlformats.org/drawingml/2006/main" xmlns:r="http://schemas.openxmlformats.org/officeDocument/2006/relationships" xmlns:p="http://schemas.openxmlformats.org/presentationml/2006/main">
+  <p:cSld>
+    <p:spTree>
+      <p:nvGrpSpPr>
+        <p:cNvPr id="1" name=""/>
+        <p:cNvGrpSpPr/>
+        <p:nvPr/>
+      </p:nvGrpSpPr>
+      <p:grpSpPr>
+        <a:xfrm>
+          <a:off x="0" y="0"/>
+          <a:ext cx="0" cy="0"/>
+          <a:chOff x="0" y="0"/>
+          <a:chExt cx="0" cy="0"/>
+        </a:xfrm>
+      </p:grpSpPr>
+      <p:sp>
+        <p:nvSpPr>
+          <p:cNvPr id="2" name="Title 1"/>
+          <p:cNvSpPr>
+            <a:spLocks noGrp="1"/>
+          </p:cNvSpPr>
+          <p:nvPr>
+            <p:ph type="title"/>
+          </p:nvPr>
+        </p:nvSpPr>
+        <p:spPr/>
+        <p:txBody>
+          <a:bodyPr/>
+          <a:lstStyle/>
+          <a:p>
+            <a:pPr algn="l"/>
+            <a:r>
+              <a:rPr lang="en-US" dirty="0" smtClean="0"/>
+              <a:t>Results</a:t>
+            </a:r>
+            <a:endParaRPr lang="en-US" dirty="0"/>
+          </a:p>
+        </p:txBody>
+      </p:sp>
+      <p:pic>
+        <p:nvPicPr>
+          <p:cNvPr id="5" name="Content Placeholder 4"/>
+          <p:cNvPicPr>
+            <a:picLocks noGrp="1" noChangeAspect="1"/>
+          </p:cNvPicPr>
+          <p:nvPr>
+            <p:ph idx="1"/>
+          </p:nvPr>
+        </p:nvPicPr>
+        <p:blipFill>
+          <a:blip r:embed="rId2">
+            <a:extLst>
+              <a:ext uri="{28A0092B-C50C-407E-A947-70E740481C1C}">
+                <a14:useLocalDpi xmlns:a14="http://schemas.microsoft.com/office/drawing/2010/main" val="0"/>
+              </a:ext>
+            </a:extLst>
+          </a:blip>
+          <a:stretch>
+            <a:fillRect/>
+          </a:stretch>
+        </p:blipFill>
+        <p:spPr>
+          <a:xfrm>
+            <a:off x="478358" y="1900052"/>
+            <a:ext cx="5686629" cy="4087699"/>
+          </a:xfrm>
+        </p:spPr>
+      </p:pic>
+      <p:pic>
+        <p:nvPicPr>
+          <p:cNvPr id="4" name="Content Placeholder 2"/>
+          <p:cNvPicPr>
+            <a:picLocks noChangeAspect="1"/>
+          </p:cNvPicPr>
+          <p:nvPr/>
+        </p:nvPicPr>
+        <p:blipFill>
+          <a:blip r:embed="rId3">
+            <a:extLst>
+              <a:ext uri="{28A0092B-C50C-407E-A947-70E740481C1C}">
+                <a14:useLocalDpi xmlns:a14="http://schemas.microsoft.com/office/drawing/2010/main" val="0"/>
+              </a:ext>
+            </a:extLst>
+          </a:blip>
+          <a:stretch>
+            <a:fillRect/>
+          </a:stretch>
+        </p:blipFill>
+        <p:spPr>
+          <a:xfrm>
+            <a:off x="6749411" y="329409"/>
+            <a:ext cx="4971533" cy="6132685"/>
+          </a:xfrm>
+          <a:prstGeom prst="rect">
+            <a:avLst/>
+          </a:prstGeom>
+        </p:spPr>
+      </p:pic>
+    </p:spTree>
+    <p:extLst>
+      <p:ext uri="{BB962C8B-B14F-4D97-AF65-F5344CB8AC3E}">
+        <p14:creationId xmlns:p14="http://schemas.microsoft.com/office/powerpoint/2010/main" val="1942041193"/>
+      </p:ext>
+    </p:extLst>
+  </p:cSld>
+  <p:clrMapOvr>
+    <a:masterClrMapping/>
+  </p:clrMapOvr>
+  <p:timing>
+    <p:tnLst>
+      <p:par>
+        <p:cTn id="1" dur="indefinite" restart="never" nodeType="tmRoot"/>
+      </p:par>
+    </p:tnLst>
+  </p:timing>
+</p:sld>
+</file>
+
+<file path=ppt/slides/slide12.xml><?xml version="1.0" encoding="utf-8"?>
+<p:sld xmlns:a="http://schemas.openxmlformats.org/drawingml/2006/main" xmlns:r="http://schemas.openxmlformats.org/officeDocument/2006/relationships" xmlns:p="http://schemas.openxmlformats.org/presentationml/2006/main">
+  <p:cSld>
+    <p:spTree>
+      <p:nvGrpSpPr>
+        <p:cNvPr id="1" name=""/>
+        <p:cNvGrpSpPr/>
+        <p:nvPr/>
+      </p:nvGrpSpPr>
+      <p:grpSpPr>
+        <a:xfrm>
+          <a:off x="0" y="0"/>
+          <a:ext cx="0" cy="0"/>
+          <a:chOff x="0" y="0"/>
+          <a:chExt cx="0" cy="0"/>
+        </a:xfrm>
+      </p:grpSpPr>
+      <p:sp>
+        <p:nvSpPr>
+          <p:cNvPr id="2" name="Title 1"/>
+          <p:cNvSpPr>
+            <a:spLocks noGrp="1"/>
+          </p:cNvSpPr>
+          <p:nvPr>
+            <p:ph type="title"/>
+          </p:nvPr>
+        </p:nvSpPr>
+        <p:spPr/>
+        <p:txBody>
+          <a:bodyPr/>
+          <a:lstStyle/>
+          <a:p>
+            <a:pPr algn="l"/>
+            <a:r>
+              <a:rPr lang="en-US" dirty="0" smtClean="0"/>
+              <a:t>Results</a:t>
+            </a:r>
+            <a:endParaRPr lang="en-US" dirty="0"/>
+          </a:p>
+        </p:txBody>
+      </p:sp>
+      <p:pic>
+        <p:nvPicPr>
+          <p:cNvPr id="5" name="Content Placeholder 4"/>
+          <p:cNvPicPr>
+            <a:picLocks noGrp="1" noChangeAspect="1"/>
+          </p:cNvPicPr>
+          <p:nvPr>
+            <p:ph idx="1"/>
+          </p:nvPr>
+        </p:nvPicPr>
+        <p:blipFill>
+          <a:blip r:embed="rId2">
+            <a:extLst>
+              <a:ext uri="{28A0092B-C50C-407E-A947-70E740481C1C}">
+                <a14:useLocalDpi xmlns:a14="http://schemas.microsoft.com/office/drawing/2010/main" val="0"/>
+              </a:ext>
+            </a:extLst>
+          </a:blip>
+          <a:stretch>
+            <a:fillRect/>
+          </a:stretch>
+        </p:blipFill>
+        <p:spPr>
+          <a:xfrm>
+            <a:off x="478358" y="1900052"/>
+            <a:ext cx="5686629" cy="4087699"/>
+          </a:xfrm>
+        </p:spPr>
+      </p:pic>
+      <p:pic>
+        <p:nvPicPr>
+          <p:cNvPr id="4" name="Content Placeholder 2"/>
+          <p:cNvPicPr>
+            <a:picLocks noChangeAspect="1"/>
+          </p:cNvPicPr>
+          <p:nvPr/>
+        </p:nvPicPr>
+        <p:blipFill>
+          <a:blip r:embed="rId3">
+            <a:extLst>
+              <a:ext uri="{28A0092B-C50C-407E-A947-70E740481C1C}">
+                <a14:useLocalDpi xmlns:a14="http://schemas.microsoft.com/office/drawing/2010/main" val="0"/>
+              </a:ext>
+            </a:extLst>
+          </a:blip>
+          <a:stretch>
+            <a:fillRect/>
+          </a:stretch>
+        </p:blipFill>
+        <p:spPr>
+          <a:xfrm>
+            <a:off x="6749411" y="329409"/>
+            <a:ext cx="4971533" cy="6132685"/>
+          </a:xfrm>
+          <a:prstGeom prst="rect">
+            <a:avLst/>
+          </a:prstGeom>
+        </p:spPr>
+      </p:pic>
+      <p:sp>
+        <p:nvSpPr>
+          <p:cNvPr id="3" name="Rectangle 2"/>
+          <p:cNvSpPr/>
+          <p:nvPr/>
+        </p:nvSpPr>
+        <p:spPr>
+          <a:xfrm>
+            <a:off x="9372600" y="329409"/>
+            <a:ext cx="1914525" cy="742154"/>
+          </a:xfrm>
+          <a:prstGeom prst="rect">
+            <a:avLst/>
+          </a:prstGeom>
+          <a:noFill/>
+          <a:ln w="25400">
+            <a:solidFill>
+              <a:srgbClr val="FF0000"/>
+            </a:solidFill>
+          </a:ln>
+        </p:spPr>
+        <p:style>
+          <a:lnRef idx="2">
+            <a:schemeClr val="accent1">
+              <a:shade val="50000"/>
+            </a:schemeClr>
+          </a:lnRef>
+          <a:fillRef idx="1">
+            <a:schemeClr val="accent1"/>
+          </a:fillRef>
+          <a:effectRef idx="0">
+            <a:schemeClr val="accent1"/>
+          </a:effectRef>
+          <a:fontRef idx="minor">
+            <a:schemeClr val="lt1"/>
+          </a:fontRef>
+        </p:style>
+        <p:txBody>
+          <a:bodyPr rtlCol="0" anchor="ctr"/>
+          <a:lstStyle/>
+          <a:p>
+            <a:pPr algn="ctr"/>
+            <a:endParaRPr lang="en-US"/>
+          </a:p>
+        </p:txBody>
+      </p:sp>
+      <p:sp>
+        <p:nvSpPr>
+          <p:cNvPr id="6" name="Rectangle 5"/>
+          <p:cNvSpPr/>
+          <p:nvPr/>
+        </p:nvSpPr>
+        <p:spPr>
+          <a:xfrm>
+            <a:off x="9572625" y="3245405"/>
+            <a:ext cx="660392" cy="1940957"/>
+          </a:xfrm>
+          <a:prstGeom prst="rect">
+            <a:avLst/>
+          </a:prstGeom>
+          <a:noFill/>
+          <a:ln w="25400">
+            <a:solidFill>
+              <a:srgbClr val="FF0000"/>
+            </a:solidFill>
+          </a:ln>
+        </p:spPr>
+        <p:style>
+          <a:lnRef idx="2">
+            <a:schemeClr val="accent1">
+              <a:shade val="50000"/>
+            </a:schemeClr>
+          </a:lnRef>
+          <a:fillRef idx="1">
+            <a:schemeClr val="accent1"/>
+          </a:fillRef>
+          <a:effectRef idx="0">
+            <a:schemeClr val="accent1"/>
+          </a:effectRef>
+          <a:fontRef idx="minor">
+            <a:schemeClr val="lt1"/>
+          </a:fontRef>
+        </p:style>
+        <p:txBody>
+          <a:bodyPr rtlCol="0" anchor="ctr"/>
+          <a:lstStyle/>
+          <a:p>
+            <a:pPr algn="ctr"/>
+            <a:endParaRPr lang="en-US"/>
+          </a:p>
+        </p:txBody>
+      </p:sp>
+      <p:sp>
+        <p:nvSpPr>
+          <p:cNvPr id="8" name="Rectangle 7"/>
+          <p:cNvSpPr/>
+          <p:nvPr/>
+        </p:nvSpPr>
+        <p:spPr>
+          <a:xfrm>
+            <a:off x="9301163" y="1271588"/>
+            <a:ext cx="2000249" cy="414338"/>
+          </a:xfrm>
+          <a:prstGeom prst="rect">
+            <a:avLst/>
+          </a:prstGeom>
+          <a:noFill/>
+          <a:ln w="25400">
+            <a:solidFill>
+              <a:srgbClr val="FF0000"/>
+            </a:solidFill>
+          </a:ln>
+        </p:spPr>
+        <p:style>
+          <a:lnRef idx="2">
+            <a:schemeClr val="accent1">
+              <a:shade val="50000"/>
+            </a:schemeClr>
+          </a:lnRef>
+          <a:fillRef idx="1">
+            <a:schemeClr val="accent1"/>
+          </a:fillRef>
+          <a:effectRef idx="0">
+            <a:schemeClr val="accent1"/>
+          </a:effectRef>
+          <a:fontRef idx="minor">
+            <a:schemeClr val="lt1"/>
+          </a:fontRef>
+        </p:style>
+        <p:txBody>
+          <a:bodyPr rtlCol="0" anchor="ctr"/>
+          <a:lstStyle/>
+          <a:p>
+            <a:pPr algn="ctr"/>
+            <a:endParaRPr lang="en-US"/>
+          </a:p>
+        </p:txBody>
+      </p:sp>
+    </p:spTree>
+    <p:extLst>
+      <p:ext uri="{BB962C8B-B14F-4D97-AF65-F5344CB8AC3E}">
+        <p14:creationId xmlns:p14="http://schemas.microsoft.com/office/powerpoint/2010/main" val="1859075699"/>
+      </p:ext>
+    </p:extLst>
+  </p:cSld>
+  <p:clrMapOvr>
+    <a:masterClrMapping/>
+  </p:clrMapOvr>
+  <p:timing>
+    <p:tnLst>
+      <p:par>
+        <p:cTn id="1" dur="indefinite" restart="never" nodeType="tmRoot"/>
+      </p:par>
+    </p:tnLst>
+  </p:timing>
+</p:sld>
+</file>
+
+<file path=ppt/slides/slide13.xml><?xml version="1.0" encoding="utf-8"?>
 <p:sld xmlns:a="http://schemas.openxmlformats.org/drawingml/2006/main" xmlns:r="http://schemas.openxmlformats.org/officeDocument/2006/relationships" xmlns:p="http://schemas.openxmlformats.org/presentationml/2006/main">
   <p:cSld>
     <p:spTree>
@@ -5655,321 +6034,6 @@
 </p:sld>
 </file>
 
-<file path=ppt/slides/slide12.xml><?xml version="1.0" encoding="utf-8"?>
-<p:sld xmlns:a="http://schemas.openxmlformats.org/drawingml/2006/main" xmlns:r="http://schemas.openxmlformats.org/officeDocument/2006/relationships" xmlns:p="http://schemas.openxmlformats.org/presentationml/2006/main">
-  <p:cSld>
-    <p:spTree>
-      <p:nvGrpSpPr>
-        <p:cNvPr id="1" name=""/>
-        <p:cNvGrpSpPr/>
-        <p:nvPr/>
-      </p:nvGrpSpPr>
-      <p:grpSpPr>
-        <a:xfrm>
-          <a:off x="0" y="0"/>
-          <a:ext cx="0" cy="0"/>
-          <a:chOff x="0" y="0"/>
-          <a:chExt cx="0" cy="0"/>
-        </a:xfrm>
-      </p:grpSpPr>
-      <p:sp>
-        <p:nvSpPr>
-          <p:cNvPr id="2" name="Title 1"/>
-          <p:cNvSpPr>
-            <a:spLocks noGrp="1"/>
-          </p:cNvSpPr>
-          <p:nvPr>
-            <p:ph type="title"/>
-          </p:nvPr>
-        </p:nvSpPr>
-        <p:spPr/>
-        <p:txBody>
-          <a:bodyPr/>
-          <a:lstStyle/>
-          <a:p>
-            <a:pPr algn="l"/>
-            <a:r>
-              <a:rPr lang="en-US" dirty="0" smtClean="0"/>
-              <a:t>Results</a:t>
-            </a:r>
-            <a:endParaRPr lang="en-US" dirty="0"/>
-          </a:p>
-        </p:txBody>
-      </p:sp>
-      <p:pic>
-        <p:nvPicPr>
-          <p:cNvPr id="5" name="Content Placeholder 4"/>
-          <p:cNvPicPr>
-            <a:picLocks noGrp="1" noChangeAspect="1"/>
-          </p:cNvPicPr>
-          <p:nvPr>
-            <p:ph idx="1"/>
-          </p:nvPr>
-        </p:nvPicPr>
-        <p:blipFill>
-          <a:blip r:embed="rId2">
-            <a:extLst>
-              <a:ext uri="{28A0092B-C50C-407E-A947-70E740481C1C}">
-                <a14:useLocalDpi xmlns:a14="http://schemas.microsoft.com/office/drawing/2010/main" val="0"/>
-              </a:ext>
-            </a:extLst>
-          </a:blip>
-          <a:stretch>
-            <a:fillRect/>
-          </a:stretch>
-        </p:blipFill>
-        <p:spPr>
-          <a:xfrm>
-            <a:off x="478358" y="1900052"/>
-            <a:ext cx="5686629" cy="4087699"/>
-          </a:xfrm>
-        </p:spPr>
-      </p:pic>
-      <p:pic>
-        <p:nvPicPr>
-          <p:cNvPr id="4" name="Content Placeholder 2"/>
-          <p:cNvPicPr>
-            <a:picLocks noChangeAspect="1"/>
-          </p:cNvPicPr>
-          <p:nvPr/>
-        </p:nvPicPr>
-        <p:blipFill>
-          <a:blip r:embed="rId3">
-            <a:extLst>
-              <a:ext uri="{28A0092B-C50C-407E-A947-70E740481C1C}">
-                <a14:useLocalDpi xmlns:a14="http://schemas.microsoft.com/office/drawing/2010/main" val="0"/>
-              </a:ext>
-            </a:extLst>
-          </a:blip>
-          <a:stretch>
-            <a:fillRect/>
-          </a:stretch>
-        </p:blipFill>
-        <p:spPr>
-          <a:xfrm>
-            <a:off x="6749411" y="329409"/>
-            <a:ext cx="4971533" cy="6132685"/>
-          </a:xfrm>
-          <a:prstGeom prst="rect">
-            <a:avLst/>
-          </a:prstGeom>
-        </p:spPr>
-      </p:pic>
-    </p:spTree>
-    <p:extLst>
-      <p:ext uri="{BB962C8B-B14F-4D97-AF65-F5344CB8AC3E}">
-        <p14:creationId xmlns:p14="http://schemas.microsoft.com/office/powerpoint/2010/main" val="1942041193"/>
-      </p:ext>
-    </p:extLst>
-  </p:cSld>
-  <p:clrMapOvr>
-    <a:masterClrMapping/>
-  </p:clrMapOvr>
-  <p:timing>
-    <p:tnLst>
-      <p:par>
-        <p:cTn id="1" dur="indefinite" restart="never" nodeType="tmRoot"/>
-      </p:par>
-    </p:tnLst>
-  </p:timing>
-</p:sld>
-</file>
-
-<file path=ppt/slides/slide13.xml><?xml version="1.0" encoding="utf-8"?>
-<p:sld xmlns:a="http://schemas.openxmlformats.org/drawingml/2006/main" xmlns:r="http://schemas.openxmlformats.org/officeDocument/2006/relationships" xmlns:p="http://schemas.openxmlformats.org/presentationml/2006/main">
-  <p:cSld>
-    <p:spTree>
-      <p:nvGrpSpPr>
-        <p:cNvPr id="1" name=""/>
-        <p:cNvGrpSpPr/>
-        <p:nvPr/>
-      </p:nvGrpSpPr>
-      <p:grpSpPr>
-        <a:xfrm>
-          <a:off x="0" y="0"/>
-          <a:ext cx="0" cy="0"/>
-          <a:chOff x="0" y="0"/>
-          <a:chExt cx="0" cy="0"/>
-        </a:xfrm>
-      </p:grpSpPr>
-      <p:sp>
-        <p:nvSpPr>
-          <p:cNvPr id="2" name="Title 1"/>
-          <p:cNvSpPr>
-            <a:spLocks noGrp="1"/>
-          </p:cNvSpPr>
-          <p:nvPr>
-            <p:ph type="title"/>
-          </p:nvPr>
-        </p:nvSpPr>
-        <p:spPr/>
-        <p:txBody>
-          <a:bodyPr/>
-          <a:lstStyle/>
-          <a:p>
-            <a:pPr algn="l"/>
-            <a:r>
-              <a:rPr lang="en-US" dirty="0" smtClean="0"/>
-              <a:t>Train</a:t>
-            </a:r>
-            <a:br>
-              <a:rPr lang="en-US" dirty="0" smtClean="0"/>
-            </a:br>
-            <a:r>
-              <a:rPr lang="en-US" dirty="0" smtClean="0"/>
-              <a:t>Test </a:t>
-            </a:r>
-            <a:br>
-              <a:rPr lang="en-US" dirty="0" smtClean="0"/>
-            </a:br>
-            <a:r>
-              <a:rPr lang="en-US" dirty="0" smtClean="0"/>
-              <a:t>Split</a:t>
-            </a:r>
-            <a:endParaRPr lang="en-US" dirty="0"/>
-          </a:p>
-        </p:txBody>
-      </p:sp>
-      <p:pic>
-        <p:nvPicPr>
-          <p:cNvPr id="6" name="Content Placeholder 5"/>
-          <p:cNvPicPr>
-            <a:picLocks noGrp="1" noChangeAspect="1"/>
-          </p:cNvPicPr>
-          <p:nvPr>
-            <p:ph idx="1"/>
-          </p:nvPr>
-        </p:nvPicPr>
-        <p:blipFill>
-          <a:blip r:embed="rId2">
-            <a:extLst>
-              <a:ext uri="{28A0092B-C50C-407E-A947-70E740481C1C}">
-                <a14:useLocalDpi xmlns:a14="http://schemas.microsoft.com/office/drawing/2010/main" val="0"/>
-              </a:ext>
-            </a:extLst>
-          </a:blip>
-          <a:stretch>
-            <a:fillRect/>
-          </a:stretch>
-        </p:blipFill>
-        <p:spPr>
-          <a:xfrm>
-            <a:off x="2881312" y="797499"/>
-            <a:ext cx="8133288" cy="4831775"/>
-          </a:xfrm>
-        </p:spPr>
-      </p:pic>
-      <p:sp>
-        <p:nvSpPr>
-          <p:cNvPr id="7" name="TextBox 6"/>
-          <p:cNvSpPr txBox="1"/>
-          <p:nvPr/>
-        </p:nvSpPr>
-        <p:spPr>
-          <a:xfrm>
-            <a:off x="5586413" y="4218856"/>
-            <a:ext cx="2044149" cy="646331"/>
-          </a:xfrm>
-          <a:prstGeom prst="rect">
-            <a:avLst/>
-          </a:prstGeom>
-          <a:noFill/>
-        </p:spPr>
-        <p:txBody>
-          <a:bodyPr wrap="none" rtlCol="0">
-            <a:spAutoFit/>
-          </a:bodyPr>
-          <a:lstStyle/>
-          <a:p>
-            <a:r>
-              <a:rPr lang="cs-CZ" dirty="0" err="1" smtClean="0">
-                <a:latin typeface="+mj-lt"/>
-              </a:rPr>
-              <a:t>Average</a:t>
-            </a:r>
-            <a:r>
-              <a:rPr lang="cs-CZ" dirty="0" smtClean="0">
-                <a:latin typeface="+mj-lt"/>
-              </a:rPr>
-              <a:t>:</a:t>
-            </a:r>
-          </a:p>
-          <a:p>
-            <a:r>
-              <a:rPr lang="cs-CZ" dirty="0" smtClean="0">
-                <a:latin typeface="+mj-lt"/>
-              </a:rPr>
-              <a:t>0.9397738449749</a:t>
-            </a:r>
-            <a:endParaRPr lang="en-US" dirty="0">
-              <a:latin typeface="+mj-lt"/>
-            </a:endParaRPr>
-          </a:p>
-        </p:txBody>
-      </p:sp>
-      <p:sp>
-        <p:nvSpPr>
-          <p:cNvPr id="8" name="Right Brace 7"/>
-          <p:cNvSpPr/>
-          <p:nvPr/>
-        </p:nvSpPr>
-        <p:spPr>
-          <a:xfrm>
-            <a:off x="4595906" y="3571875"/>
-            <a:ext cx="761907" cy="1940295"/>
-          </a:xfrm>
-          <a:prstGeom prst="rightBrace">
-            <a:avLst/>
-          </a:prstGeom>
-          <a:ln w="25400">
-            <a:solidFill>
-              <a:schemeClr val="tx1"/>
-            </a:solidFill>
-          </a:ln>
-        </p:spPr>
-        <p:style>
-          <a:lnRef idx="1">
-            <a:schemeClr val="accent1"/>
-          </a:lnRef>
-          <a:fillRef idx="0">
-            <a:schemeClr val="accent1"/>
-          </a:fillRef>
-          <a:effectRef idx="0">
-            <a:schemeClr val="accent1"/>
-          </a:effectRef>
-          <a:fontRef idx="minor">
-            <a:schemeClr val="tx1"/>
-          </a:fontRef>
-        </p:style>
-        <p:txBody>
-          <a:bodyPr rtlCol="0" anchor="ctr"/>
-          <a:lstStyle/>
-          <a:p>
-            <a:pPr algn="ctr"/>
-            <a:endParaRPr lang="en-US"/>
-          </a:p>
-        </p:txBody>
-      </p:sp>
-    </p:spTree>
-    <p:extLst>
-      <p:ext uri="{BB962C8B-B14F-4D97-AF65-F5344CB8AC3E}">
-        <p14:creationId xmlns:p14="http://schemas.microsoft.com/office/powerpoint/2010/main" val="1805874254"/>
-      </p:ext>
-    </p:extLst>
-  </p:cSld>
-  <p:clrMapOvr>
-    <a:masterClrMapping/>
-  </p:clrMapOvr>
-  <p:timing>
-    <p:tnLst>
-      <p:par>
-        <p:cTn id="1" dur="indefinite" restart="never" nodeType="tmRoot"/>
-      </p:par>
-    </p:tnLst>
-  </p:timing>
-</p:sld>
-</file>
-
 <file path=ppt/slides/slide14.xml><?xml version="1.0" encoding="utf-8"?>
 <p:sld xmlns:a="http://schemas.openxmlformats.org/drawingml/2006/main" xmlns:r="http://schemas.openxmlformats.org/officeDocument/2006/relationships" xmlns:p="http://schemas.openxmlformats.org/presentationml/2006/main">
   <p:cSld>
@@ -5997,127 +6061,158 @@
             <p:ph type="title"/>
           </p:nvPr>
         </p:nvSpPr>
-        <p:spPr>
-          <a:xfrm>
-            <a:off x="762000" y="559678"/>
-            <a:ext cx="4667250" cy="4952492"/>
-          </a:xfrm>
-        </p:spPr>
+        <p:spPr/>
         <p:txBody>
           <a:bodyPr/>
           <a:lstStyle/>
           <a:p>
+            <a:pPr algn="l"/>
             <a:r>
               <a:rPr lang="en-US" dirty="0" smtClean="0"/>
-              <a:t>Regularization</a:t>
+              <a:t>Train</a:t>
+            </a:r>
+            <a:br>
+              <a:rPr lang="en-US" dirty="0" smtClean="0"/>
+            </a:br>
+            <a:r>
+              <a:rPr lang="en-US" dirty="0" smtClean="0"/>
+              <a:t>Test </a:t>
+            </a:r>
+            <a:br>
+              <a:rPr lang="en-US" dirty="0" smtClean="0"/>
+            </a:br>
+            <a:r>
+              <a:rPr lang="en-US" dirty="0" smtClean="0"/>
+              <a:t>Split</a:t>
             </a:r>
             <a:endParaRPr lang="en-US" dirty="0"/>
           </a:p>
         </p:txBody>
       </p:sp>
-      <p:sp>
-        <p:nvSpPr>
-          <p:cNvPr id="3" name="Content Placeholder 2"/>
-          <p:cNvSpPr>
-            <a:spLocks noGrp="1"/>
-          </p:cNvSpPr>
+      <p:pic>
+        <p:nvPicPr>
+          <p:cNvPr id="6" name="Content Placeholder 5"/>
+          <p:cNvPicPr>
+            <a:picLocks noGrp="1" noChangeAspect="1"/>
+          </p:cNvPicPr>
           <p:nvPr>
             <p:ph idx="1"/>
           </p:nvPr>
-        </p:nvSpPr>
-        <p:spPr>
-          <a:xfrm>
-            <a:off x="762000" y="1814512"/>
-            <a:ext cx="6248398" cy="4281122"/>
-          </a:xfrm>
-        </p:spPr>
-        <p:txBody>
-          <a:bodyPr/>
+        </p:nvPicPr>
+        <p:blipFill>
+          <a:blip r:embed="rId2">
+            <a:extLst>
+              <a:ext uri="{28A0092B-C50C-407E-A947-70E740481C1C}">
+                <a14:useLocalDpi xmlns:a14="http://schemas.microsoft.com/office/drawing/2010/main" val="0"/>
+              </a:ext>
+            </a:extLst>
+          </a:blip>
+          <a:stretch>
+            <a:fillRect/>
+          </a:stretch>
+        </p:blipFill>
+        <p:spPr>
+          <a:xfrm>
+            <a:off x="2881312" y="797499"/>
+            <a:ext cx="8133288" cy="4831775"/>
+          </a:xfrm>
+        </p:spPr>
+      </p:pic>
+      <p:sp>
+        <p:nvSpPr>
+          <p:cNvPr id="7" name="TextBox 6"/>
+          <p:cNvSpPr txBox="1"/>
+          <p:nvPr/>
+        </p:nvSpPr>
+        <p:spPr>
+          <a:xfrm>
+            <a:off x="5586413" y="4218856"/>
+            <a:ext cx="2044149" cy="646331"/>
+          </a:xfrm>
+          <a:prstGeom prst="rect">
+            <a:avLst/>
+          </a:prstGeom>
+          <a:noFill/>
+        </p:spPr>
+        <p:txBody>
+          <a:bodyPr wrap="none" rtlCol="0">
+            <a:spAutoFit/>
+          </a:bodyPr>
           <a:lstStyle/>
           <a:p>
-            <a:pPr marL="0" indent="0">
-              <a:buNone/>
-            </a:pPr>
-            <a:r>
-              <a:rPr lang="en-US" b="1" dirty="0" err="1" smtClean="0">
+            <a:r>
+              <a:rPr lang="cs-CZ" dirty="0" err="1" smtClean="0">
                 <a:latin typeface="+mj-lt"/>
               </a:rPr>
-              <a:t>ElasticNet</a:t>
-            </a:r>
-            <a:r>
-              <a:rPr lang="en-US" b="1" dirty="0" smtClean="0">
+              <a:t>Average</a:t>
+            </a:r>
+            <a:r>
+              <a:rPr lang="cs-CZ" dirty="0" smtClean="0">
                 <a:latin typeface="+mj-lt"/>
               </a:rPr>
-              <a:t> Regularization</a:t>
-            </a:r>
-          </a:p>
-          <a:p>
-            <a:pPr marL="0" indent="0">
-              <a:buNone/>
-            </a:pPr>
+              <a:t>:</a:t>
+            </a:r>
+          </a:p>
+          <a:p>
+            <a:r>
+              <a:rPr lang="cs-CZ" dirty="0" smtClean="0">
+                <a:latin typeface="+mj-lt"/>
+              </a:rPr>
+              <a:t>0.9397738449749</a:t>
+            </a:r>
             <a:endParaRPr lang="en-US" dirty="0">
               <a:latin typeface="+mj-lt"/>
             </a:endParaRPr>
           </a:p>
-          <a:p>
-            <a:pPr marL="0" indent="0">
-              <a:buNone/>
-            </a:pPr>
-            <a:r>
-              <a:rPr lang="en-US" dirty="0" smtClean="0">
-                <a:latin typeface="+mj-lt"/>
-              </a:rPr>
-              <a:t>alpha: 	1 e9</a:t>
-            </a:r>
-          </a:p>
-          <a:p>
-            <a:pPr marL="0" indent="0">
-              <a:buNone/>
-            </a:pPr>
-            <a:r>
-              <a:rPr lang="en-US" dirty="0" smtClean="0">
-                <a:latin typeface="+mj-lt"/>
-              </a:rPr>
-              <a:t>R^2:	0.95205484861 </a:t>
-            </a:r>
-          </a:p>
-          <a:p>
-            <a:pPr marL="0" indent="0">
-              <a:buNone/>
-            </a:pPr>
-            <a:r>
-              <a:rPr lang="en-US" dirty="0" smtClean="0">
-                <a:latin typeface="+mj-lt"/>
-              </a:rPr>
-              <a:t>MSE: 	1.21871813475 e14</a:t>
-            </a:r>
-          </a:p>
-          <a:p>
-            <a:pPr marL="0" indent="0">
-              <a:buNone/>
-            </a:pPr>
-            <a:r>
-              <a:rPr lang="en-US" dirty="0" smtClean="0">
-                <a:latin typeface="+mj-lt"/>
-              </a:rPr>
-              <a:t>(RMSE: </a:t>
-            </a:r>
-            <a:r>
-              <a:rPr lang="hr-HR" dirty="0" smtClean="0">
-                <a:latin typeface="+mj-lt"/>
-              </a:rPr>
-              <a:t>1.104 e8)</a:t>
-            </a:r>
-            <a:endParaRPr lang="en-US" dirty="0">
-              <a:latin typeface="+mj-lt"/>
-            </a:endParaRPr>
+        </p:txBody>
+      </p:sp>
+      <p:sp>
+        <p:nvSpPr>
+          <p:cNvPr id="8" name="Right Brace 7"/>
+          <p:cNvSpPr/>
+          <p:nvPr/>
+        </p:nvSpPr>
+        <p:spPr>
+          <a:xfrm>
+            <a:off x="4595906" y="3571875"/>
+            <a:ext cx="761907" cy="1940295"/>
+          </a:xfrm>
+          <a:prstGeom prst="rightBrace">
+            <a:avLst/>
+          </a:prstGeom>
+          <a:ln w="25400">
+            <a:solidFill>
+              <a:schemeClr val="tx1"/>
+            </a:solidFill>
+          </a:ln>
+        </p:spPr>
+        <p:style>
+          <a:lnRef idx="1">
+            <a:schemeClr val="accent1"/>
+          </a:lnRef>
+          <a:fillRef idx="0">
+            <a:schemeClr val="accent1"/>
+          </a:fillRef>
+          <a:effectRef idx="0">
+            <a:schemeClr val="accent1"/>
+          </a:effectRef>
+          <a:fontRef idx="minor">
+            <a:schemeClr val="tx1"/>
+          </a:fontRef>
+        </p:style>
+        <p:txBody>
+          <a:bodyPr rtlCol="0" anchor="ctr"/>
+          <a:lstStyle/>
+          <a:p>
+            <a:pPr algn="ctr"/>
+            <a:endParaRPr lang="en-US"/>
           </a:p>
         </p:txBody>
       </p:sp>
     </p:spTree>
     <p:extLst>
       <p:ext uri="{BB962C8B-B14F-4D97-AF65-F5344CB8AC3E}">
-        <p14:creationId xmlns:p14="http://schemas.microsoft.com/office/powerpoint/2010/main" val="2129675254"/>
+        <p14:creationId xmlns:p14="http://schemas.microsoft.com/office/powerpoint/2010/main" val="1805874254"/>
       </p:ext>
     </p:extLst>
   </p:cSld>
@@ -6521,7 +6616,7 @@
       </p:sp>
       <p:pic>
         <p:nvPicPr>
-          <p:cNvPr id="4" name="Picture 3"/>
+          <p:cNvPr id="14" name="Picture 13"/>
           <p:cNvPicPr>
             <a:picLocks noChangeAspect="1"/>
           </p:cNvPicPr>
@@ -6541,47 +6636,17 @@
         </p:blipFill>
         <p:spPr>
           <a:xfrm>
-            <a:off x="242888" y="1474312"/>
-            <a:ext cx="5740048" cy="3824124"/>
+            <a:off x="6877050" y="1666165"/>
+            <a:ext cx="4876800" cy="3467100"/>
           </a:xfrm>
           <a:prstGeom prst="rect">
             <a:avLst/>
           </a:prstGeom>
         </p:spPr>
       </p:pic>
-      <p:cxnSp>
-        <p:nvCxnSpPr>
-          <p:cNvPr id="6" name="Straight Connector 5"/>
-          <p:cNvCxnSpPr/>
-          <p:nvPr/>
-        </p:nvCxnSpPr>
-        <p:spPr>
-          <a:xfrm>
-            <a:off x="657380" y="3350748"/>
-            <a:ext cx="5129058" cy="35626"/>
-          </a:xfrm>
-          <a:prstGeom prst="line">
-            <a:avLst/>
-          </a:prstGeom>
-        </p:spPr>
-        <p:style>
-          <a:lnRef idx="1">
-            <a:schemeClr val="accent2"/>
-          </a:lnRef>
-          <a:fillRef idx="0">
-            <a:schemeClr val="accent2"/>
-          </a:fillRef>
-          <a:effectRef idx="0">
-            <a:schemeClr val="accent2"/>
-          </a:effectRef>
-          <a:fontRef idx="minor">
-            <a:schemeClr val="tx1"/>
-          </a:fontRef>
-        </p:style>
-      </p:cxnSp>
       <p:pic>
         <p:nvPicPr>
-          <p:cNvPr id="7" name="Picture 6"/>
+          <p:cNvPr id="15" name="Picture 14"/>
           <p:cNvPicPr>
             <a:picLocks noChangeAspect="1"/>
           </p:cNvPicPr>
@@ -6601,89 +6666,14 @@
         </p:blipFill>
         <p:spPr>
           <a:xfrm>
-            <a:off x="6254089" y="1319737"/>
-            <a:ext cx="5715000" cy="3978699"/>
+            <a:off x="762000" y="1545515"/>
+            <a:ext cx="5270500" cy="3708400"/>
           </a:xfrm>
           <a:prstGeom prst="rect">
             <a:avLst/>
           </a:prstGeom>
         </p:spPr>
       </p:pic>
-      <p:cxnSp>
-        <p:nvCxnSpPr>
-          <p:cNvPr id="11" name="Straight Connector 10"/>
-          <p:cNvCxnSpPr/>
-          <p:nvPr/>
-        </p:nvCxnSpPr>
-        <p:spPr>
-          <a:xfrm flipH="1">
-            <a:off x="8058150" y="4700582"/>
-            <a:ext cx="1" cy="426398"/>
-          </a:xfrm>
-          <a:prstGeom prst="line">
-            <a:avLst/>
-          </a:prstGeom>
-          <a:ln w="28575">
-            <a:solidFill>
-              <a:srgbClr val="FF0000"/>
-            </a:solidFill>
-          </a:ln>
-        </p:spPr>
-        <p:style>
-          <a:lnRef idx="1">
-            <a:schemeClr val="accent1"/>
-          </a:lnRef>
-          <a:fillRef idx="0">
-            <a:schemeClr val="accent1"/>
-          </a:fillRef>
-          <a:effectRef idx="0">
-            <a:schemeClr val="accent1"/>
-          </a:effectRef>
-          <a:fontRef idx="minor">
-            <a:schemeClr val="tx1"/>
-          </a:fontRef>
-        </p:style>
-      </p:cxnSp>
-      <p:sp>
-        <p:nvSpPr>
-          <p:cNvPr id="13" name="TextBox 12"/>
-          <p:cNvSpPr txBox="1"/>
-          <p:nvPr/>
-        </p:nvSpPr>
-        <p:spPr>
-          <a:xfrm>
-            <a:off x="7741396" y="5199498"/>
-            <a:ext cx="633507" cy="369332"/>
-          </a:xfrm>
-          <a:prstGeom prst="rect">
-            <a:avLst/>
-          </a:prstGeom>
-          <a:noFill/>
-        </p:spPr>
-        <p:txBody>
-          <a:bodyPr wrap="none" rtlCol="0">
-            <a:spAutoFit/>
-          </a:bodyPr>
-          <a:lstStyle/>
-          <a:p>
-            <a:r>
-              <a:rPr lang="en-US" dirty="0" smtClean="0">
-                <a:solidFill>
-                  <a:srgbClr val="FF0000"/>
-                </a:solidFill>
-                <a:latin typeface="+mj-lt"/>
-              </a:rPr>
-              <a:t>0.25</a:t>
-            </a:r>
-            <a:endParaRPr lang="en-US" dirty="0">
-              <a:solidFill>
-                <a:srgbClr val="FF0000"/>
-              </a:solidFill>
-              <a:latin typeface="+mj-lt"/>
-            </a:endParaRPr>
-          </a:p>
-        </p:txBody>
-      </p:sp>
     </p:spTree>
     <p:extLst>
       <p:ext uri="{BB962C8B-B14F-4D97-AF65-F5344CB8AC3E}">
@@ -6736,9 +6726,10 @@
           <a:bodyPr/>
           <a:lstStyle/>
           <a:p>
+            <a:pPr algn="l"/>
             <a:r>
               <a:rPr lang="en-US" dirty="0" smtClean="0"/>
-              <a:t>Questions</a:t>
+              <a:t>Overall</a:t>
             </a:r>
             <a:endParaRPr lang="en-US" dirty="0"/>
           </a:p>
@@ -6759,7 +6750,33 @@
           <a:bodyPr/>
           <a:lstStyle/>
           <a:p>
-            <a:endParaRPr lang="en-US"/>
+            <a:endParaRPr lang="en-US" dirty="0">
+              <a:latin typeface="+mj-lt"/>
+            </a:endParaRPr>
+          </a:p>
+          <a:p>
+            <a:r>
+              <a:rPr lang="en-US" dirty="0" smtClean="0">
+                <a:latin typeface="+mj-lt"/>
+              </a:rPr>
+              <a:t>Being popular in Australia and the US is a good indicator that your band will do well overall.</a:t>
+            </a:r>
+          </a:p>
+          <a:p>
+            <a:endParaRPr lang="en-US" dirty="0">
+              <a:latin typeface="+mj-lt"/>
+            </a:endParaRPr>
+          </a:p>
+          <a:p>
+            <a:r>
+              <a:rPr lang="en-US" dirty="0" smtClean="0">
+                <a:latin typeface="+mj-lt"/>
+              </a:rPr>
+              <a:t>If you want your band to gain popularity, focus advertising in the US and Australia </a:t>
+            </a:r>
+            <a:endParaRPr lang="en-US" dirty="0">
+              <a:latin typeface="+mj-lt"/>
+            </a:endParaRPr>
           </a:p>
         </p:txBody>
       </p:sp>
@@ -6767,6 +6784,67 @@
     <p:extLst>
       <p:ext uri="{BB962C8B-B14F-4D97-AF65-F5344CB8AC3E}">
         <p14:creationId xmlns:p14="http://schemas.microsoft.com/office/powerpoint/2010/main" val="282379998"/>
+      </p:ext>
+    </p:extLst>
+  </p:cSld>
+  <p:clrMapOvr>
+    <a:masterClrMapping/>
+  </p:clrMapOvr>
+  <p:timing>
+    <p:tnLst>
+      <p:par>
+        <p:cTn id="1" dur="indefinite" restart="never" nodeType="tmRoot"/>
+      </p:par>
+    </p:tnLst>
+  </p:timing>
+</p:sld>
+</file>
+
+<file path=ppt/slides/slide18.xml><?xml version="1.0" encoding="utf-8"?>
+<p:sld xmlns:a="http://schemas.openxmlformats.org/drawingml/2006/main" xmlns:r="http://schemas.openxmlformats.org/officeDocument/2006/relationships" xmlns:p="http://schemas.openxmlformats.org/presentationml/2006/main">
+  <p:cSld>
+    <p:spTree>
+      <p:nvGrpSpPr>
+        <p:cNvPr id="1" name=""/>
+        <p:cNvGrpSpPr/>
+        <p:nvPr/>
+      </p:nvGrpSpPr>
+      <p:grpSpPr>
+        <a:xfrm>
+          <a:off x="0" y="0"/>
+          <a:ext cx="0" cy="0"/>
+          <a:chOff x="0" y="0"/>
+          <a:chExt cx="0" cy="0"/>
+        </a:xfrm>
+      </p:grpSpPr>
+      <p:sp>
+        <p:nvSpPr>
+          <p:cNvPr id="2" name="Title 1"/>
+          <p:cNvSpPr>
+            <a:spLocks noGrp="1"/>
+          </p:cNvSpPr>
+          <p:nvPr>
+            <p:ph type="title"/>
+          </p:nvPr>
+        </p:nvSpPr>
+        <p:spPr/>
+        <p:txBody>
+          <a:bodyPr/>
+          <a:lstStyle/>
+          <a:p>
+            <a:pPr algn="l"/>
+            <a:r>
+              <a:rPr lang="en-US" dirty="0" smtClean="0"/>
+              <a:t>Questions?</a:t>
+            </a:r>
+            <a:endParaRPr lang="en-US" dirty="0"/>
+          </a:p>
+        </p:txBody>
+      </p:sp>
+    </p:spTree>
+    <p:extLst>
+      <p:ext uri="{BB962C8B-B14F-4D97-AF65-F5344CB8AC3E}">
+        <p14:creationId xmlns:p14="http://schemas.microsoft.com/office/powerpoint/2010/main" val="324200350"/>
       </p:ext>
     </p:extLst>
   </p:cSld>

</xml_diff>